<commit_message>
image view window properties added
</commit_message>
<xml_diff>
--- a/Icons/icons.pptx
+++ b/Icons/icons.pptx
@@ -421,12 +421,12 @@
   <pc:docChgLst>
     <pc:chgData name="Ludwig Sembach" userId="f8993c4f9875f6c3" providerId="LiveId" clId="{3A5716D8-1420-4378-99C0-440A8EB493AE}"/>
     <pc:docChg chg="modSld">
-      <pc:chgData name="Ludwig Sembach" userId="f8993c4f9875f6c3" providerId="LiveId" clId="{3A5716D8-1420-4378-99C0-440A8EB493AE}" dt="2022-01-11T23:04:46.688" v="41" actId="688"/>
+      <pc:chgData name="Ludwig Sembach" userId="f8993c4f9875f6c3" providerId="LiveId" clId="{3A5716D8-1420-4378-99C0-440A8EB493AE}" dt="2022-01-12T15:15:15.997" v="49" actId="1076"/>
       <pc:docMkLst>
         <pc:docMk/>
       </pc:docMkLst>
       <pc:sldChg chg="addSp modSp mod">
-        <pc:chgData name="Ludwig Sembach" userId="f8993c4f9875f6c3" providerId="LiveId" clId="{3A5716D8-1420-4378-99C0-440A8EB493AE}" dt="2022-01-11T23:04:46.688" v="41" actId="688"/>
+        <pc:chgData name="Ludwig Sembach" userId="f8993c4f9875f6c3" providerId="LiveId" clId="{3A5716D8-1420-4378-99C0-440A8EB493AE}" dt="2022-01-12T15:15:15.997" v="49" actId="1076"/>
         <pc:sldMkLst>
           <pc:docMk/>
           <pc:sldMk cId="1423015805" sldId="256"/>
@@ -472,6 +472,14 @@
           </ac:picMkLst>
         </pc:picChg>
         <pc:picChg chg="add mod">
+          <ac:chgData name="Ludwig Sembach" userId="f8993c4f9875f6c3" providerId="LiveId" clId="{3A5716D8-1420-4378-99C0-440A8EB493AE}" dt="2022-01-12T13:12:14.250" v="46" actId="1582"/>
+          <ac:picMkLst>
+            <pc:docMk/>
+            <pc:sldMk cId="1423015805" sldId="256"/>
+            <ac:picMk id="11" creationId="{2FE5F568-C397-4B3A-B6BC-333BCC788550}"/>
+          </ac:picMkLst>
+        </pc:picChg>
+        <pc:picChg chg="add mod">
           <ac:chgData name="Ludwig Sembach" userId="f8993c4f9875f6c3" providerId="LiveId" clId="{3A5716D8-1420-4378-99C0-440A8EB493AE}" dt="2022-01-07T21:19:24.612" v="10" actId="207"/>
           <ac:picMkLst>
             <pc:docMk/>
@@ -485,6 +493,14 @@
             <pc:docMk/>
             <pc:sldMk cId="1423015805" sldId="256"/>
             <ac:picMk id="15" creationId="{3485197F-E9EA-4B2A-AB89-14D487BF569E}"/>
+          </ac:picMkLst>
+        </pc:picChg>
+        <pc:picChg chg="add mod">
+          <ac:chgData name="Ludwig Sembach" userId="f8993c4f9875f6c3" providerId="LiveId" clId="{3A5716D8-1420-4378-99C0-440A8EB493AE}" dt="2022-01-12T15:15:15.997" v="49" actId="1076"/>
+          <ac:picMkLst>
+            <pc:docMk/>
+            <pc:sldMk cId="1423015805" sldId="256"/>
+            <ac:picMk id="17" creationId="{10387F57-865A-4756-89BF-749375D55620}"/>
           </ac:picMkLst>
         </pc:picChg>
         <pc:picChg chg="add mod ord">
@@ -5844,6 +5860,84 @@
           </a:prstGeom>
         </p:spPr>
       </p:pic>
+      <p:pic>
+        <p:nvPicPr>
+          <p:cNvPr id="11" name="Graphic 10" descr="Download outline">
+            <a:extLst>
+              <a:ext uri="{FF2B5EF4-FFF2-40B4-BE49-F238E27FC236}">
+                <a16:creationId xmlns:a16="http://schemas.microsoft.com/office/drawing/2014/main" id="{2FE5F568-C397-4B3A-B6BC-333BCC788550}"/>
+              </a:ext>
+            </a:extLst>
+          </p:cNvPr>
+          <p:cNvPicPr>
+            <a:picLocks noChangeAspect="1"/>
+          </p:cNvPicPr>
+          <p:nvPr/>
+        </p:nvPicPr>
+        <p:blipFill>
+          <a:blip r:embed="rId30">
+            <a:extLst>
+              <a:ext uri="{28A0092B-C50C-407E-A947-70E740481C1C}">
+                <a14:useLocalDpi xmlns:a14="http://schemas.microsoft.com/office/drawing/2010/main" val="0"/>
+              </a:ext>
+              <a:ext uri="{96DAC541-7B7A-43D3-8B79-37D633B846F1}">
+                <asvg:svgBlip xmlns:asvg="http://schemas.microsoft.com/office/drawing/2016/SVG/main" r:embed="rId31"/>
+              </a:ext>
+            </a:extLst>
+          </a:blip>
+          <a:stretch>
+            <a:fillRect/>
+          </a:stretch>
+        </p:blipFill>
+        <p:spPr>
+          <a:xfrm>
+            <a:off x="9916602" y="1595582"/>
+            <a:ext cx="914400" cy="914400"/>
+          </a:xfrm>
+          <a:prstGeom prst="rect">
+            <a:avLst/>
+          </a:prstGeom>
+        </p:spPr>
+      </p:pic>
+      <p:pic>
+        <p:nvPicPr>
+          <p:cNvPr id="17" name="Graphic 16" descr="Garbage with solid fill">
+            <a:extLst>
+              <a:ext uri="{FF2B5EF4-FFF2-40B4-BE49-F238E27FC236}">
+                <a16:creationId xmlns:a16="http://schemas.microsoft.com/office/drawing/2014/main" id="{10387F57-865A-4756-89BF-749375D55620}"/>
+              </a:ext>
+            </a:extLst>
+          </p:cNvPr>
+          <p:cNvPicPr>
+            <a:picLocks noChangeAspect="1"/>
+          </p:cNvPicPr>
+          <p:nvPr/>
+        </p:nvPicPr>
+        <p:blipFill>
+          <a:blip r:embed="rId32">
+            <a:extLst>
+              <a:ext uri="{28A0092B-C50C-407E-A947-70E740481C1C}">
+                <a14:useLocalDpi xmlns:a14="http://schemas.microsoft.com/office/drawing/2010/main" val="0"/>
+              </a:ext>
+              <a:ext uri="{96DAC541-7B7A-43D3-8B79-37D633B846F1}">
+                <asvg:svgBlip xmlns:asvg="http://schemas.microsoft.com/office/drawing/2016/SVG/main" r:embed="rId33"/>
+              </a:ext>
+            </a:extLst>
+          </a:blip>
+          <a:stretch>
+            <a:fillRect/>
+          </a:stretch>
+        </p:blipFill>
+        <p:spPr>
+          <a:xfrm>
+            <a:off x="6680489" y="2272857"/>
+            <a:ext cx="914400" cy="914400"/>
+          </a:xfrm>
+          <a:prstGeom prst="rect">
+            <a:avLst/>
+          </a:prstGeom>
+        </p:spPr>
+      </p:pic>
     </p:spTree>
     <p:extLst>
       <p:ext uri="{BB962C8B-B14F-4D97-AF65-F5344CB8AC3E}">

</xml_diff>

<commit_message>
folder and file dialogs added
</commit_message>
<xml_diff>
--- a/Icons/icons.pptx
+++ b/Icons/icons.pptx
@@ -7,6 +7,7 @@
   <p:sldIdLst>
     <p:sldId id="257" r:id="rId2"/>
     <p:sldId id="256" r:id="rId3"/>
+    <p:sldId id="258" r:id="rId4"/>
   </p:sldIdLst>
   <p:sldSz cx="12192000" cy="6858000"/>
   <p:notesSz cx="6858000" cy="9144000"/>
@@ -420,8 +421,8 @@
   </pc:docChgLst>
   <pc:docChgLst>
     <pc:chgData name="Ludwig Sembach" userId="f8993c4f9875f6c3" providerId="LiveId" clId="{3A5716D8-1420-4378-99C0-440A8EB493AE}"/>
-    <pc:docChg chg="modSld">
-      <pc:chgData name="Ludwig Sembach" userId="f8993c4f9875f6c3" providerId="LiveId" clId="{3A5716D8-1420-4378-99C0-440A8EB493AE}" dt="2022-01-12T15:15:15.997" v="49" actId="1076"/>
+    <pc:docChg chg="custSel addSld modSld">
+      <pc:chgData name="Ludwig Sembach" userId="f8993c4f9875f6c3" providerId="LiveId" clId="{3A5716D8-1420-4378-99C0-440A8EB493AE}" dt="2022-01-12T16:30:19.819" v="84" actId="1076"/>
       <pc:docMkLst>
         <pc:docMk/>
       </pc:docMkLst>
@@ -517,6 +518,77 @@
             <pc:docMk/>
             <pc:sldMk cId="1423015805" sldId="256"/>
             <ac:picMk id="22" creationId="{BC093738-D99E-4E3F-97EA-0213FF5DBCBB}"/>
+          </ac:picMkLst>
+        </pc:picChg>
+      </pc:sldChg>
+      <pc:sldChg chg="addSp delSp modSp new mod">
+        <pc:chgData name="Ludwig Sembach" userId="f8993c4f9875f6c3" providerId="LiveId" clId="{3A5716D8-1420-4378-99C0-440A8EB493AE}" dt="2022-01-12T16:30:19.819" v="84" actId="1076"/>
+        <pc:sldMkLst>
+          <pc:docMk/>
+          <pc:sldMk cId="2759640423" sldId="258"/>
+        </pc:sldMkLst>
+        <pc:spChg chg="del">
+          <ac:chgData name="Ludwig Sembach" userId="f8993c4f9875f6c3" providerId="LiveId" clId="{3A5716D8-1420-4378-99C0-440A8EB493AE}" dt="2022-01-12T16:26:04.249" v="51" actId="478"/>
+          <ac:spMkLst>
+            <pc:docMk/>
+            <pc:sldMk cId="2759640423" sldId="258"/>
+            <ac:spMk id="2" creationId="{83CF09E6-74D0-4134-A635-133D94E9BF0C}"/>
+          </ac:spMkLst>
+        </pc:spChg>
+        <pc:spChg chg="del">
+          <ac:chgData name="Ludwig Sembach" userId="f8993c4f9875f6c3" providerId="LiveId" clId="{3A5716D8-1420-4378-99C0-440A8EB493AE}" dt="2022-01-12T16:26:04.249" v="51" actId="478"/>
+          <ac:spMkLst>
+            <pc:docMk/>
+            <pc:sldMk cId="2759640423" sldId="258"/>
+            <ac:spMk id="3" creationId="{BC239AAC-43E8-42CB-91A0-BFCDEDA0EADF}"/>
+          </ac:spMkLst>
+        </pc:spChg>
+        <pc:spChg chg="add mod">
+          <ac:chgData name="Ludwig Sembach" userId="f8993c4f9875f6c3" providerId="LiveId" clId="{3A5716D8-1420-4378-99C0-440A8EB493AE}" dt="2022-01-12T16:27:53.201" v="68" actId="1076"/>
+          <ac:spMkLst>
+            <pc:docMk/>
+            <pc:sldMk cId="2759640423" sldId="258"/>
+            <ac:spMk id="12" creationId="{F165A236-3E46-487A-80F4-5D2F3FEB4C1A}"/>
+          </ac:spMkLst>
+        </pc:spChg>
+        <pc:picChg chg="add mod">
+          <ac:chgData name="Ludwig Sembach" userId="f8993c4f9875f6c3" providerId="LiveId" clId="{3A5716D8-1420-4378-99C0-440A8EB493AE}" dt="2022-01-12T16:30:18.282" v="83" actId="1076"/>
+          <ac:picMkLst>
+            <pc:docMk/>
+            <pc:sldMk cId="2759640423" sldId="258"/>
+            <ac:picMk id="5" creationId="{9B9964E5-EF5B-438D-97B4-767B98DE2A81}"/>
+          </ac:picMkLst>
+        </pc:picChg>
+        <pc:picChg chg="add mod">
+          <ac:chgData name="Ludwig Sembach" userId="f8993c4f9875f6c3" providerId="LiveId" clId="{3A5716D8-1420-4378-99C0-440A8EB493AE}" dt="2022-01-12T16:30:16.340" v="82" actId="1076"/>
+          <ac:picMkLst>
+            <pc:docMk/>
+            <pc:sldMk cId="2759640423" sldId="258"/>
+            <ac:picMk id="7" creationId="{556E0487-4C82-4542-852E-BA5670909779}"/>
+          </ac:picMkLst>
+        </pc:picChg>
+        <pc:picChg chg="add mod">
+          <ac:chgData name="Ludwig Sembach" userId="f8993c4f9875f6c3" providerId="LiveId" clId="{3A5716D8-1420-4378-99C0-440A8EB493AE}" dt="2022-01-12T16:30:19.819" v="84" actId="1076"/>
+          <ac:picMkLst>
+            <pc:docMk/>
+            <pc:sldMk cId="2759640423" sldId="258"/>
+            <ac:picMk id="9" creationId="{3608455D-9306-40D6-991B-64BFFE8B7D88}"/>
+          </ac:picMkLst>
+        </pc:picChg>
+        <pc:picChg chg="add mod">
+          <ac:chgData name="Ludwig Sembach" userId="f8993c4f9875f6c3" providerId="LiveId" clId="{3A5716D8-1420-4378-99C0-440A8EB493AE}" dt="2022-01-12T16:30:14.089" v="81" actId="1076"/>
+          <ac:picMkLst>
+            <pc:docMk/>
+            <pc:sldMk cId="2759640423" sldId="258"/>
+            <ac:picMk id="11" creationId="{5E0B1E92-29C4-4684-936C-B105A10A6E7E}"/>
+          </ac:picMkLst>
+        </pc:picChg>
+        <pc:picChg chg="add del mod">
+          <ac:chgData name="Ludwig Sembach" userId="f8993c4f9875f6c3" providerId="LiveId" clId="{3A5716D8-1420-4378-99C0-440A8EB493AE}" dt="2022-01-12T16:29:31.633" v="76" actId="478"/>
+          <ac:picMkLst>
+            <pc:docMk/>
+            <pc:sldMk cId="2759640423" sldId="258"/>
+            <ac:picMk id="14" creationId="{86EB12FE-C520-42D9-9397-858B130913CC}"/>
           </ac:picMkLst>
         </pc:picChg>
       </pc:sldChg>
@@ -5951,6 +6023,228 @@
 </p:sld>
 </file>
 
+<file path=ppt/slides/slide3.xml><?xml version="1.0" encoding="utf-8"?>
+<p:sld xmlns:a="http://schemas.openxmlformats.org/drawingml/2006/main" xmlns:r="http://schemas.openxmlformats.org/officeDocument/2006/relationships" xmlns:p="http://schemas.openxmlformats.org/presentationml/2006/main">
+  <p:cSld>
+    <p:spTree>
+      <p:nvGrpSpPr>
+        <p:cNvPr id="1" name=""/>
+        <p:cNvGrpSpPr/>
+        <p:nvPr/>
+      </p:nvGrpSpPr>
+      <p:grpSpPr>
+        <a:xfrm>
+          <a:off x="0" y="0"/>
+          <a:ext cx="0" cy="0"/>
+          <a:chOff x="0" y="0"/>
+          <a:chExt cx="0" cy="0"/>
+        </a:xfrm>
+      </p:grpSpPr>
+      <p:pic>
+        <p:nvPicPr>
+          <p:cNvPr id="5" name="Graphic 4" descr="Badge Question Mark with solid fill">
+            <a:extLst>
+              <a:ext uri="{FF2B5EF4-FFF2-40B4-BE49-F238E27FC236}">
+                <a16:creationId xmlns:a16="http://schemas.microsoft.com/office/drawing/2014/main" id="{9B9964E5-EF5B-438D-97B4-767B98DE2A81}"/>
+              </a:ext>
+            </a:extLst>
+          </p:cNvPr>
+          <p:cNvPicPr>
+            <a:picLocks noChangeAspect="1"/>
+          </p:cNvPicPr>
+          <p:nvPr/>
+        </p:nvPicPr>
+        <p:blipFill>
+          <a:blip r:embed="rId2">
+            <a:extLst>
+              <a:ext uri="{28A0092B-C50C-407E-A947-70E740481C1C}">
+                <a14:useLocalDpi xmlns:a14="http://schemas.microsoft.com/office/drawing/2010/main" val="0"/>
+              </a:ext>
+              <a:ext uri="{96DAC541-7B7A-43D3-8B79-37D633B846F1}">
+                <asvg:svgBlip xmlns:asvg="http://schemas.microsoft.com/office/drawing/2016/SVG/main" r:embed="rId3"/>
+              </a:ext>
+            </a:extLst>
+          </a:blip>
+          <a:stretch>
+            <a:fillRect/>
+          </a:stretch>
+        </p:blipFill>
+        <p:spPr>
+          <a:xfrm>
+            <a:off x="7160216" y="3537012"/>
+            <a:ext cx="3600000" cy="3600000"/>
+          </a:xfrm>
+          <a:prstGeom prst="rect">
+            <a:avLst/>
+          </a:prstGeom>
+        </p:spPr>
+      </p:pic>
+      <p:pic>
+        <p:nvPicPr>
+          <p:cNvPr id="7" name="Graphic 6" descr="Information with solid fill">
+            <a:extLst>
+              <a:ext uri="{FF2B5EF4-FFF2-40B4-BE49-F238E27FC236}">
+                <a16:creationId xmlns:a16="http://schemas.microsoft.com/office/drawing/2014/main" id="{556E0487-4C82-4542-852E-BA5670909779}"/>
+              </a:ext>
+            </a:extLst>
+          </p:cNvPr>
+          <p:cNvPicPr>
+            <a:picLocks noChangeAspect="1"/>
+          </p:cNvPicPr>
+          <p:nvPr/>
+        </p:nvPicPr>
+        <p:blipFill>
+          <a:blip r:embed="rId4">
+            <a:extLst>
+              <a:ext uri="{28A0092B-C50C-407E-A947-70E740481C1C}">
+                <a14:useLocalDpi xmlns:a14="http://schemas.microsoft.com/office/drawing/2010/main" val="0"/>
+              </a:ext>
+              <a:ext uri="{96DAC541-7B7A-43D3-8B79-37D633B846F1}">
+                <asvg:svgBlip xmlns:asvg="http://schemas.microsoft.com/office/drawing/2016/SVG/main" r:embed="rId5"/>
+              </a:ext>
+            </a:extLst>
+          </a:blip>
+          <a:stretch>
+            <a:fillRect/>
+          </a:stretch>
+        </p:blipFill>
+        <p:spPr>
+          <a:xfrm>
+            <a:off x="7051919" y="0"/>
+            <a:ext cx="3600000" cy="3600000"/>
+          </a:xfrm>
+          <a:prstGeom prst="rect">
+            <a:avLst/>
+          </a:prstGeom>
+        </p:spPr>
+      </p:pic>
+      <p:pic>
+        <p:nvPicPr>
+          <p:cNvPr id="9" name="Graphic 8" descr="Warning with solid fill">
+            <a:extLst>
+              <a:ext uri="{FF2B5EF4-FFF2-40B4-BE49-F238E27FC236}">
+                <a16:creationId xmlns:a16="http://schemas.microsoft.com/office/drawing/2014/main" id="{3608455D-9306-40D6-991B-64BFFE8B7D88}"/>
+              </a:ext>
+            </a:extLst>
+          </p:cNvPr>
+          <p:cNvPicPr>
+            <a:picLocks noChangeAspect="1"/>
+          </p:cNvPicPr>
+          <p:nvPr/>
+        </p:nvPicPr>
+        <p:blipFill>
+          <a:blip r:embed="rId6">
+            <a:extLst>
+              <a:ext uri="{28A0092B-C50C-407E-A947-70E740481C1C}">
+                <a14:useLocalDpi xmlns:a14="http://schemas.microsoft.com/office/drawing/2010/main" val="0"/>
+              </a:ext>
+              <a:ext uri="{96DAC541-7B7A-43D3-8B79-37D633B846F1}">
+                <asvg:svgBlip xmlns:asvg="http://schemas.microsoft.com/office/drawing/2016/SVG/main" r:embed="rId7"/>
+              </a:ext>
+            </a:extLst>
+          </a:blip>
+          <a:stretch>
+            <a:fillRect/>
+          </a:stretch>
+        </p:blipFill>
+        <p:spPr>
+          <a:xfrm>
+            <a:off x="2316861" y="3429000"/>
+            <a:ext cx="3600000" cy="3600000"/>
+          </a:xfrm>
+          <a:prstGeom prst="rect">
+            <a:avLst/>
+          </a:prstGeom>
+        </p:spPr>
+      </p:pic>
+      <p:pic>
+        <p:nvPicPr>
+          <p:cNvPr id="11" name="Graphic 10" descr="Irritant with solid fill">
+            <a:extLst>
+              <a:ext uri="{FF2B5EF4-FFF2-40B4-BE49-F238E27FC236}">
+                <a16:creationId xmlns:a16="http://schemas.microsoft.com/office/drawing/2014/main" id="{5E0B1E92-29C4-4684-936C-B105A10A6E7E}"/>
+              </a:ext>
+            </a:extLst>
+          </p:cNvPr>
+          <p:cNvPicPr>
+            <a:picLocks noChangeAspect="1"/>
+          </p:cNvPicPr>
+          <p:nvPr/>
+        </p:nvPicPr>
+        <p:blipFill>
+          <a:blip r:embed="rId8">
+            <a:extLst>
+              <a:ext uri="{28A0092B-C50C-407E-A947-70E740481C1C}">
+                <a14:useLocalDpi xmlns:a14="http://schemas.microsoft.com/office/drawing/2010/main" val="0"/>
+              </a:ext>
+              <a:ext uri="{96DAC541-7B7A-43D3-8B79-37D633B846F1}">
+                <asvg:svgBlip xmlns:asvg="http://schemas.microsoft.com/office/drawing/2016/SVG/main" r:embed="rId9"/>
+              </a:ext>
+            </a:extLst>
+          </a:blip>
+          <a:stretch>
+            <a:fillRect/>
+          </a:stretch>
+        </p:blipFill>
+        <p:spPr>
+          <a:xfrm>
+            <a:off x="2208564" y="-62988"/>
+            <a:ext cx="3600000" cy="3600000"/>
+          </a:xfrm>
+          <a:prstGeom prst="rect">
+            <a:avLst/>
+          </a:prstGeom>
+        </p:spPr>
+      </p:pic>
+      <p:sp>
+        <p:nvSpPr>
+          <p:cNvPr id="12" name="TextBox 11">
+            <a:extLst>
+              <a:ext uri="{FF2B5EF4-FFF2-40B4-BE49-F238E27FC236}">
+                <a16:creationId xmlns:a16="http://schemas.microsoft.com/office/drawing/2014/main" id="{F165A236-3E46-487A-80F4-5D2F3FEB4C1A}"/>
+              </a:ext>
+            </a:extLst>
+          </p:cNvPr>
+          <p:cNvSpPr txBox="1"/>
+          <p:nvPr/>
+        </p:nvSpPr>
+        <p:spPr>
+          <a:xfrm>
+            <a:off x="856912" y="905069"/>
+            <a:ext cx="1351652" cy="369332"/>
+          </a:xfrm>
+          <a:prstGeom prst="rect">
+            <a:avLst/>
+          </a:prstGeom>
+          <a:noFill/>
+        </p:spPr>
+        <p:txBody>
+          <a:bodyPr wrap="none" rtlCol="0">
+            <a:spAutoFit/>
+          </a:bodyPr>
+          <a:lstStyle/>
+          <a:p>
+            <a:r>
+              <a:rPr lang="en-US" dirty="0" err="1"/>
+              <a:t>MessageBox</a:t>
+            </a:r>
+            <a:endParaRPr lang="en-DE" dirty="0"/>
+          </a:p>
+        </p:txBody>
+      </p:sp>
+    </p:spTree>
+    <p:extLst>
+      <p:ext uri="{BB962C8B-B14F-4D97-AF65-F5344CB8AC3E}">
+        <p14:creationId xmlns:p14="http://schemas.microsoft.com/office/powerpoint/2010/main" val="2759640423"/>
+      </p:ext>
+    </p:extLst>
+  </p:cSld>
+  <p:clrMapOvr>
+    <a:masterClrMapping/>
+  </p:clrMapOvr>
+</p:sld>
+</file>
+
 <file path=ppt/theme/theme1.xml><?xml version="1.0" encoding="utf-8"?>
 <a:theme xmlns:a="http://schemas.openxmlformats.org/drawingml/2006/main" name="Office Theme">
   <a:themeElements>

</xml_diff>

<commit_message>
mark as favorite menu added to image view window
</commit_message>
<xml_diff>
--- a/Icons/icons.pptx
+++ b/Icons/icons.pptx
@@ -7,7 +7,8 @@
   <p:sldIdLst>
     <p:sldId id="257" r:id="rId2"/>
     <p:sldId id="256" r:id="rId3"/>
-    <p:sldId id="258" r:id="rId4"/>
+    <p:sldId id="259" r:id="rId4"/>
+    <p:sldId id="258" r:id="rId5"/>
   </p:sldIdLst>
   <p:sldSz cx="12192000" cy="6858000"/>
   <p:notesSz cx="6858000" cy="9144000"/>
@@ -594,6 +595,70 @@
       </pc:sldChg>
     </pc:docChg>
   </pc:docChgLst>
+  <pc:docChgLst>
+    <pc:chgData name="Ludwig Sembach" userId="f8993c4f9875f6c3" providerId="LiveId" clId="{5EF81DD2-70D6-426C-B4A0-746E92C1E5B6}"/>
+    <pc:docChg chg="custSel addSld modSld">
+      <pc:chgData name="Ludwig Sembach" userId="f8993c4f9875f6c3" providerId="LiveId" clId="{5EF81DD2-70D6-426C-B4A0-746E92C1E5B6}" dt="2022-03-07T22:00:27.576" v="7" actId="1076"/>
+      <pc:docMkLst>
+        <pc:docMk/>
+      </pc:docMkLst>
+      <pc:sldChg chg="addSp delSp modSp new mod">
+        <pc:chgData name="Ludwig Sembach" userId="f8993c4f9875f6c3" providerId="LiveId" clId="{5EF81DD2-70D6-426C-B4A0-746E92C1E5B6}" dt="2022-03-07T22:00:27.576" v="7" actId="1076"/>
+        <pc:sldMkLst>
+          <pc:docMk/>
+          <pc:sldMk cId="3167571959" sldId="259"/>
+        </pc:sldMkLst>
+        <pc:spChg chg="del">
+          <ac:chgData name="Ludwig Sembach" userId="f8993c4f9875f6c3" providerId="LiveId" clId="{5EF81DD2-70D6-426C-B4A0-746E92C1E5B6}" dt="2022-03-07T21:53:51.078" v="1" actId="478"/>
+          <ac:spMkLst>
+            <pc:docMk/>
+            <pc:sldMk cId="3167571959" sldId="259"/>
+            <ac:spMk id="2" creationId="{87772DEC-808F-4E2A-B877-2054D731A5E9}"/>
+          </ac:spMkLst>
+        </pc:spChg>
+        <pc:spChg chg="del">
+          <ac:chgData name="Ludwig Sembach" userId="f8993c4f9875f6c3" providerId="LiveId" clId="{5EF81DD2-70D6-426C-B4A0-746E92C1E5B6}" dt="2022-03-07T21:53:51.078" v="1" actId="478"/>
+          <ac:spMkLst>
+            <pc:docMk/>
+            <pc:sldMk cId="3167571959" sldId="259"/>
+            <ac:spMk id="3" creationId="{97F58A4D-7C72-4A8C-BE92-20599345BFD4}"/>
+          </ac:spMkLst>
+        </pc:spChg>
+        <pc:picChg chg="add mod">
+          <ac:chgData name="Ludwig Sembach" userId="f8993c4f9875f6c3" providerId="LiveId" clId="{5EF81DD2-70D6-426C-B4A0-746E92C1E5B6}" dt="2022-03-07T21:53:55.869" v="3" actId="207"/>
+          <ac:picMkLst>
+            <pc:docMk/>
+            <pc:sldMk cId="3167571959" sldId="259"/>
+            <ac:picMk id="4" creationId="{D01B3C37-1F12-4CB7-B1F5-9B90BBCD5DAF}"/>
+          </ac:picMkLst>
+        </pc:picChg>
+        <pc:picChg chg="add mod">
+          <ac:chgData name="Ludwig Sembach" userId="f8993c4f9875f6c3" providerId="LiveId" clId="{5EF81DD2-70D6-426C-B4A0-746E92C1E5B6}" dt="2022-03-07T21:53:55.869" v="3" actId="207"/>
+          <ac:picMkLst>
+            <pc:docMk/>
+            <pc:sldMk cId="3167571959" sldId="259"/>
+            <ac:picMk id="5" creationId="{1D4490DB-D5FE-43C3-A5DF-68FE2144AD2F}"/>
+          </ac:picMkLst>
+        </pc:picChg>
+        <pc:picChg chg="add mod">
+          <ac:chgData name="Ludwig Sembach" userId="f8993c4f9875f6c3" providerId="LiveId" clId="{5EF81DD2-70D6-426C-B4A0-746E92C1E5B6}" dt="2022-03-07T21:53:58.692" v="4" actId="1076"/>
+          <ac:picMkLst>
+            <pc:docMk/>
+            <pc:sldMk cId="3167571959" sldId="259"/>
+            <ac:picMk id="6" creationId="{DC2AC7FC-75A8-4F79-A0DB-F9B9E4C99C60}"/>
+          </ac:picMkLst>
+        </pc:picChg>
+        <pc:picChg chg="add mod">
+          <ac:chgData name="Ludwig Sembach" userId="f8993c4f9875f6c3" providerId="LiveId" clId="{5EF81DD2-70D6-426C-B4A0-746E92C1E5B6}" dt="2022-03-07T22:00:27.576" v="7" actId="1076"/>
+          <ac:picMkLst>
+            <pc:docMk/>
+            <pc:sldMk cId="3167571959" sldId="259"/>
+            <ac:picMk id="8" creationId="{7588231F-1691-4B56-B929-A46E15A3131D}"/>
+          </ac:picMkLst>
+        </pc:picChg>
+      </pc:sldChg>
+    </pc:docChg>
+  </pc:docChgLst>
 </pc:chgInfo>
 </file>
 
@@ -746,7 +811,7 @@
           <a:p>
             <a:fld id="{491D2BDA-6D50-47D5-9A42-A5FDEEAC005E}" type="datetimeFigureOut">
               <a:rPr lang="en-DE" smtClean="0"/>
-              <a:t>12/01/2022</a:t>
+              <a:t>07/03/2022</a:t>
             </a:fld>
             <a:endParaRPr lang="en-DE"/>
           </a:p>
@@ -946,7 +1011,7 @@
           <a:p>
             <a:fld id="{491D2BDA-6D50-47D5-9A42-A5FDEEAC005E}" type="datetimeFigureOut">
               <a:rPr lang="en-DE" smtClean="0"/>
-              <a:t>12/01/2022</a:t>
+              <a:t>07/03/2022</a:t>
             </a:fld>
             <a:endParaRPr lang="en-DE"/>
           </a:p>
@@ -1156,7 +1221,7 @@
           <a:p>
             <a:fld id="{491D2BDA-6D50-47D5-9A42-A5FDEEAC005E}" type="datetimeFigureOut">
               <a:rPr lang="en-DE" smtClean="0"/>
-              <a:t>12/01/2022</a:t>
+              <a:t>07/03/2022</a:t>
             </a:fld>
             <a:endParaRPr lang="en-DE"/>
           </a:p>
@@ -1356,7 +1421,7 @@
           <a:p>
             <a:fld id="{491D2BDA-6D50-47D5-9A42-A5FDEEAC005E}" type="datetimeFigureOut">
               <a:rPr lang="en-DE" smtClean="0"/>
-              <a:t>12/01/2022</a:t>
+              <a:t>07/03/2022</a:t>
             </a:fld>
             <a:endParaRPr lang="en-DE"/>
           </a:p>
@@ -1632,7 +1697,7 @@
           <a:p>
             <a:fld id="{491D2BDA-6D50-47D5-9A42-A5FDEEAC005E}" type="datetimeFigureOut">
               <a:rPr lang="en-DE" smtClean="0"/>
-              <a:t>12/01/2022</a:t>
+              <a:t>07/03/2022</a:t>
             </a:fld>
             <a:endParaRPr lang="en-DE"/>
           </a:p>
@@ -1900,7 +1965,7 @@
           <a:p>
             <a:fld id="{491D2BDA-6D50-47D5-9A42-A5FDEEAC005E}" type="datetimeFigureOut">
               <a:rPr lang="en-DE" smtClean="0"/>
-              <a:t>12/01/2022</a:t>
+              <a:t>07/03/2022</a:t>
             </a:fld>
             <a:endParaRPr lang="en-DE"/>
           </a:p>
@@ -2315,7 +2380,7 @@
           <a:p>
             <a:fld id="{491D2BDA-6D50-47D5-9A42-A5FDEEAC005E}" type="datetimeFigureOut">
               <a:rPr lang="en-DE" smtClean="0"/>
-              <a:t>12/01/2022</a:t>
+              <a:t>07/03/2022</a:t>
             </a:fld>
             <a:endParaRPr lang="en-DE"/>
           </a:p>
@@ -2457,7 +2522,7 @@
           <a:p>
             <a:fld id="{491D2BDA-6D50-47D5-9A42-A5FDEEAC005E}" type="datetimeFigureOut">
               <a:rPr lang="en-DE" smtClean="0"/>
-              <a:t>12/01/2022</a:t>
+              <a:t>07/03/2022</a:t>
             </a:fld>
             <a:endParaRPr lang="en-DE"/>
           </a:p>
@@ -2570,7 +2635,7 @@
           <a:p>
             <a:fld id="{491D2BDA-6D50-47D5-9A42-A5FDEEAC005E}" type="datetimeFigureOut">
               <a:rPr lang="en-DE" smtClean="0"/>
-              <a:t>12/01/2022</a:t>
+              <a:t>07/03/2022</a:t>
             </a:fld>
             <a:endParaRPr lang="en-DE"/>
           </a:p>
@@ -2883,7 +2948,7 @@
           <a:p>
             <a:fld id="{491D2BDA-6D50-47D5-9A42-A5FDEEAC005E}" type="datetimeFigureOut">
               <a:rPr lang="en-DE" smtClean="0"/>
-              <a:t>12/01/2022</a:t>
+              <a:t>07/03/2022</a:t>
             </a:fld>
             <a:endParaRPr lang="en-DE"/>
           </a:p>
@@ -3172,7 +3237,7 @@
           <a:p>
             <a:fld id="{491D2BDA-6D50-47D5-9A42-A5FDEEAC005E}" type="datetimeFigureOut">
               <a:rPr lang="en-DE" smtClean="0"/>
-              <a:t>12/01/2022</a:t>
+              <a:t>07/03/2022</a:t>
             </a:fld>
             <a:endParaRPr lang="en-DE"/>
           </a:p>
@@ -3415,7 +3480,7 @@
           <a:p>
             <a:fld id="{491D2BDA-6D50-47D5-9A42-A5FDEEAC005E}" type="datetimeFigureOut">
               <a:rPr lang="en-DE" smtClean="0"/>
-              <a:t>12/01/2022</a:t>
+              <a:t>07/03/2022</a:t>
             </a:fld>
             <a:endParaRPr lang="en-DE"/>
           </a:p>
@@ -6042,6 +6107,192 @@
       </p:grpSpPr>
       <p:pic>
         <p:nvPicPr>
+          <p:cNvPr id="4" name="Graphic 3" descr="Eye with solid fill">
+            <a:extLst>
+              <a:ext uri="{FF2B5EF4-FFF2-40B4-BE49-F238E27FC236}">
+                <a16:creationId xmlns:a16="http://schemas.microsoft.com/office/drawing/2014/main" id="{D01B3C37-1F12-4CB7-B1F5-9B90BBCD5DAF}"/>
+              </a:ext>
+            </a:extLst>
+          </p:cNvPr>
+          <p:cNvPicPr>
+            <a:picLocks noChangeAspect="1"/>
+          </p:cNvPicPr>
+          <p:nvPr/>
+        </p:nvPicPr>
+        <p:blipFill>
+          <a:blip r:embed="rId2">
+            <a:extLst>
+              <a:ext uri="{28A0092B-C50C-407E-A947-70E740481C1C}">
+                <a14:useLocalDpi xmlns:a14="http://schemas.microsoft.com/office/drawing/2010/main" val="0"/>
+              </a:ext>
+              <a:ext uri="{96DAC541-7B7A-43D3-8B79-37D633B846F1}">
+                <asvg:svgBlip xmlns:asvg="http://schemas.microsoft.com/office/drawing/2016/SVG/main" r:embed="rId3"/>
+              </a:ext>
+            </a:extLst>
+          </a:blip>
+          <a:stretch>
+            <a:fillRect/>
+          </a:stretch>
+        </p:blipFill>
+        <p:spPr>
+          <a:xfrm>
+            <a:off x="5517500" y="1385596"/>
+            <a:ext cx="914400" cy="914400"/>
+          </a:xfrm>
+          <a:prstGeom prst="rect">
+            <a:avLst/>
+          </a:prstGeom>
+        </p:spPr>
+      </p:pic>
+      <p:pic>
+        <p:nvPicPr>
+          <p:cNvPr id="5" name="Graphic 4" descr="Close with solid fill">
+            <a:extLst>
+              <a:ext uri="{FF2B5EF4-FFF2-40B4-BE49-F238E27FC236}">
+                <a16:creationId xmlns:a16="http://schemas.microsoft.com/office/drawing/2014/main" id="{1D4490DB-D5FE-43C3-A5DF-68FE2144AD2F}"/>
+              </a:ext>
+            </a:extLst>
+          </p:cNvPr>
+          <p:cNvPicPr>
+            <a:picLocks noChangeAspect="1"/>
+          </p:cNvPicPr>
+          <p:nvPr/>
+        </p:nvPicPr>
+        <p:blipFill>
+          <a:blip r:embed="rId4">
+            <a:extLst>
+              <a:ext uri="{28A0092B-C50C-407E-A947-70E740481C1C}">
+                <a14:useLocalDpi xmlns:a14="http://schemas.microsoft.com/office/drawing/2010/main" val="0"/>
+              </a:ext>
+              <a:ext uri="{96DAC541-7B7A-43D3-8B79-37D633B846F1}">
+                <asvg:svgBlip xmlns:asvg="http://schemas.microsoft.com/office/drawing/2016/SVG/main" r:embed="rId5"/>
+              </a:ext>
+            </a:extLst>
+          </a:blip>
+          <a:stretch>
+            <a:fillRect/>
+          </a:stretch>
+        </p:blipFill>
+        <p:spPr>
+          <a:xfrm>
+            <a:off x="5538191" y="2299996"/>
+            <a:ext cx="914400" cy="914400"/>
+          </a:xfrm>
+          <a:prstGeom prst="rect">
+            <a:avLst/>
+          </a:prstGeom>
+        </p:spPr>
+      </p:pic>
+      <p:pic>
+        <p:nvPicPr>
+          <p:cNvPr id="6" name="Graphic 5" descr="Images with solid fill">
+            <a:extLst>
+              <a:ext uri="{FF2B5EF4-FFF2-40B4-BE49-F238E27FC236}">
+                <a16:creationId xmlns:a16="http://schemas.microsoft.com/office/drawing/2014/main" id="{DC2AC7FC-75A8-4F79-A0DB-F9B9E4C99C60}"/>
+              </a:ext>
+            </a:extLst>
+          </p:cNvPr>
+          <p:cNvPicPr>
+            <a:picLocks noChangeAspect="1"/>
+          </p:cNvPicPr>
+          <p:nvPr/>
+        </p:nvPicPr>
+        <p:blipFill>
+          <a:blip r:embed="rId6">
+            <a:extLst>
+              <a:ext uri="{28A0092B-C50C-407E-A947-70E740481C1C}">
+                <a14:useLocalDpi xmlns:a14="http://schemas.microsoft.com/office/drawing/2010/main" val="0"/>
+              </a:ext>
+              <a:ext uri="{96DAC541-7B7A-43D3-8B79-37D633B846F1}">
+                <asvg:svgBlip xmlns:asvg="http://schemas.microsoft.com/office/drawing/2016/SVG/main" r:embed="rId7"/>
+              </a:ext>
+            </a:extLst>
+          </a:blip>
+          <a:stretch>
+            <a:fillRect/>
+          </a:stretch>
+        </p:blipFill>
+        <p:spPr>
+          <a:xfrm>
+            <a:off x="5638800" y="3292530"/>
+            <a:ext cx="914400" cy="914400"/>
+          </a:xfrm>
+          <a:prstGeom prst="rect">
+            <a:avLst/>
+          </a:prstGeom>
+        </p:spPr>
+      </p:pic>
+      <p:pic>
+        <p:nvPicPr>
+          <p:cNvPr id="8" name="Graphic 7" descr="Star with solid fill">
+            <a:extLst>
+              <a:ext uri="{FF2B5EF4-FFF2-40B4-BE49-F238E27FC236}">
+                <a16:creationId xmlns:a16="http://schemas.microsoft.com/office/drawing/2014/main" id="{7588231F-1691-4B56-B929-A46E15A3131D}"/>
+              </a:ext>
+            </a:extLst>
+          </p:cNvPr>
+          <p:cNvPicPr>
+            <a:picLocks noChangeAspect="1"/>
+          </p:cNvPicPr>
+          <p:nvPr/>
+        </p:nvPicPr>
+        <p:blipFill>
+          <a:blip r:embed="rId8">
+            <a:extLst>
+              <a:ext uri="{28A0092B-C50C-407E-A947-70E740481C1C}">
+                <a14:useLocalDpi xmlns:a14="http://schemas.microsoft.com/office/drawing/2010/main" val="0"/>
+              </a:ext>
+              <a:ext uri="{96DAC541-7B7A-43D3-8B79-37D633B846F1}">
+                <asvg:svgBlip xmlns:asvg="http://schemas.microsoft.com/office/drawing/2016/SVG/main" r:embed="rId9"/>
+              </a:ext>
+            </a:extLst>
+          </a:blip>
+          <a:stretch>
+            <a:fillRect/>
+          </a:stretch>
+        </p:blipFill>
+        <p:spPr>
+          <a:xfrm>
+            <a:off x="6953442" y="1712168"/>
+            <a:ext cx="914400" cy="914400"/>
+          </a:xfrm>
+          <a:prstGeom prst="rect">
+            <a:avLst/>
+          </a:prstGeom>
+        </p:spPr>
+      </p:pic>
+    </p:spTree>
+    <p:extLst>
+      <p:ext uri="{BB962C8B-B14F-4D97-AF65-F5344CB8AC3E}">
+        <p14:creationId xmlns:p14="http://schemas.microsoft.com/office/powerpoint/2010/main" val="3167571959"/>
+      </p:ext>
+    </p:extLst>
+  </p:cSld>
+  <p:clrMapOvr>
+    <a:masterClrMapping/>
+  </p:clrMapOvr>
+</p:sld>
+</file>
+
+<file path=ppt/slides/slide4.xml><?xml version="1.0" encoding="utf-8"?>
+<p:sld xmlns:a="http://schemas.openxmlformats.org/drawingml/2006/main" xmlns:r="http://schemas.openxmlformats.org/officeDocument/2006/relationships" xmlns:p="http://schemas.openxmlformats.org/presentationml/2006/main">
+  <p:cSld>
+    <p:spTree>
+      <p:nvGrpSpPr>
+        <p:cNvPr id="1" name=""/>
+        <p:cNvGrpSpPr/>
+        <p:nvPr/>
+      </p:nvGrpSpPr>
+      <p:grpSpPr>
+        <a:xfrm>
+          <a:off x="0" y="0"/>
+          <a:ext cx="0" cy="0"/>
+          <a:chOff x="0" y="0"/>
+          <a:chExt cx="0" cy="0"/>
+        </a:xfrm>
+      </p:grpSpPr>
+      <p:pic>
+        <p:nvPicPr>
           <p:cNvPr id="5" name="Graphic 4" descr="Badge Question Mark with solid fill">
             <a:extLst>
               <a:ext uri="{FF2B5EF4-FFF2-40B4-BE49-F238E27FC236}">

</xml_diff>

<commit_message>
edit category window design created
</commit_message>
<xml_diff>
--- a/Icons/icons.pptx
+++ b/Icons/icons.pptx
@@ -598,12 +598,12 @@
   <pc:docChgLst>
     <pc:chgData name="Ludwig Sembach" userId="f8993c4f9875f6c3" providerId="LiveId" clId="{5EF81DD2-70D6-426C-B4A0-746E92C1E5B6}"/>
     <pc:docChg chg="custSel addSld modSld">
-      <pc:chgData name="Ludwig Sembach" userId="f8993c4f9875f6c3" providerId="LiveId" clId="{5EF81DD2-70D6-426C-B4A0-746E92C1E5B6}" dt="2022-03-12T17:52:50.419" v="12" actId="1076"/>
+      <pc:chgData name="Ludwig Sembach" userId="f8993c4f9875f6c3" providerId="LiveId" clId="{5EF81DD2-70D6-426C-B4A0-746E92C1E5B6}" dt="2022-03-12T19:19:24.923" v="19" actId="1076"/>
       <pc:docMkLst>
         <pc:docMk/>
       </pc:docMkLst>
       <pc:sldChg chg="addSp modSp mod">
-        <pc:chgData name="Ludwig Sembach" userId="f8993c4f9875f6c3" providerId="LiveId" clId="{5EF81DD2-70D6-426C-B4A0-746E92C1E5B6}" dt="2022-03-12T17:52:50.419" v="12" actId="1076"/>
+        <pc:chgData name="Ludwig Sembach" userId="f8993c4f9875f6c3" providerId="LiveId" clId="{5EF81DD2-70D6-426C-B4A0-746E92C1E5B6}" dt="2022-03-12T19:19:24.923" v="19" actId="1076"/>
         <pc:sldMkLst>
           <pc:docMk/>
           <pc:sldMk cId="1423015805" sldId="256"/>
@@ -614,6 +614,22 @@
             <pc:docMk/>
             <pc:sldMk cId="1423015805" sldId="256"/>
             <ac:picMk id="13" creationId="{75E34441-A561-48D0-9DD1-1F16D2CD02A0}"/>
+          </ac:picMkLst>
+        </pc:picChg>
+        <pc:picChg chg="add mod">
+          <ac:chgData name="Ludwig Sembach" userId="f8993c4f9875f6c3" providerId="LiveId" clId="{5EF81DD2-70D6-426C-B4A0-746E92C1E5B6}" dt="2022-03-12T19:19:24.923" v="19" actId="1076"/>
+          <ac:picMkLst>
+            <pc:docMk/>
+            <pc:sldMk cId="1423015805" sldId="256"/>
+            <ac:picMk id="23" creationId="{C0C237BC-61F6-487F-92D9-17CB42AF86D0}"/>
+          </ac:picMkLst>
+        </pc:picChg>
+        <pc:picChg chg="add mod">
+          <ac:chgData name="Ludwig Sembach" userId="f8993c4f9875f6c3" providerId="LiveId" clId="{5EF81DD2-70D6-426C-B4A0-746E92C1E5B6}" dt="2022-03-12T19:19:22.222" v="18" actId="1076"/>
+          <ac:picMkLst>
+            <pc:docMk/>
+            <pc:sldMk cId="1423015805" sldId="256"/>
+            <ac:picMk id="25" creationId="{DEAE0658-1C05-4910-B289-B33A988A5FCF}"/>
           </ac:picMkLst>
         </pc:picChg>
       </pc:sldChg>
@@ -6129,6 +6145,84 @@
           </a:prstGeom>
         </p:spPr>
       </p:pic>
+      <p:pic>
+        <p:nvPicPr>
+          <p:cNvPr id="23" name="Graphic 22" descr="Disconnected with solid fill">
+            <a:extLst>
+              <a:ext uri="{FF2B5EF4-FFF2-40B4-BE49-F238E27FC236}">
+                <a16:creationId xmlns:a16="http://schemas.microsoft.com/office/drawing/2014/main" id="{C0C237BC-61F6-487F-92D9-17CB42AF86D0}"/>
+              </a:ext>
+            </a:extLst>
+          </p:cNvPr>
+          <p:cNvPicPr>
+            <a:picLocks noChangeAspect="1"/>
+          </p:cNvPicPr>
+          <p:nvPr/>
+        </p:nvPicPr>
+        <p:blipFill>
+          <a:blip r:embed="rId36">
+            <a:extLst>
+              <a:ext uri="{28A0092B-C50C-407E-A947-70E740481C1C}">
+                <a14:useLocalDpi xmlns:a14="http://schemas.microsoft.com/office/drawing/2010/main" val="0"/>
+              </a:ext>
+              <a:ext uri="{96DAC541-7B7A-43D3-8B79-37D633B846F1}">
+                <asvg:svgBlip xmlns:asvg="http://schemas.microsoft.com/office/drawing/2016/SVG/main" r:embed="rId37"/>
+              </a:ext>
+            </a:extLst>
+          </a:blip>
+          <a:stretch>
+            <a:fillRect/>
+          </a:stretch>
+        </p:blipFill>
+        <p:spPr>
+          <a:xfrm>
+            <a:off x="10462721" y="3856860"/>
+            <a:ext cx="914400" cy="914400"/>
+          </a:xfrm>
+          <a:prstGeom prst="rect">
+            <a:avLst/>
+          </a:prstGeom>
+        </p:spPr>
+      </p:pic>
+      <p:pic>
+        <p:nvPicPr>
+          <p:cNvPr id="25" name="Graphic 24" descr="Connected with solid fill">
+            <a:extLst>
+              <a:ext uri="{FF2B5EF4-FFF2-40B4-BE49-F238E27FC236}">
+                <a16:creationId xmlns:a16="http://schemas.microsoft.com/office/drawing/2014/main" id="{DEAE0658-1C05-4910-B289-B33A988A5FCF}"/>
+              </a:ext>
+            </a:extLst>
+          </p:cNvPr>
+          <p:cNvPicPr>
+            <a:picLocks noChangeAspect="1"/>
+          </p:cNvPicPr>
+          <p:nvPr/>
+        </p:nvPicPr>
+        <p:blipFill>
+          <a:blip r:embed="rId38">
+            <a:extLst>
+              <a:ext uri="{28A0092B-C50C-407E-A947-70E740481C1C}">
+                <a14:useLocalDpi xmlns:a14="http://schemas.microsoft.com/office/drawing/2010/main" val="0"/>
+              </a:ext>
+              <a:ext uri="{96DAC541-7B7A-43D3-8B79-37D633B846F1}">
+                <asvg:svgBlip xmlns:asvg="http://schemas.microsoft.com/office/drawing/2016/SVG/main" r:embed="rId39"/>
+              </a:ext>
+            </a:extLst>
+          </a:blip>
+          <a:stretch>
+            <a:fillRect/>
+          </a:stretch>
+        </p:blipFill>
+        <p:spPr>
+          <a:xfrm>
+            <a:off x="10373802" y="2772588"/>
+            <a:ext cx="914400" cy="914400"/>
+          </a:xfrm>
+          <a:prstGeom prst="rect">
+            <a:avLst/>
+          </a:prstGeom>
+        </p:spPr>
+      </p:pic>
     </p:spTree>
     <p:extLst>
       <p:ext uri="{BB962C8B-B14F-4D97-AF65-F5344CB8AC3E}">

</xml_diff>

<commit_message>
category windows: add subcategory + unlink subcategory implemented
</commit_message>
<xml_diff>
--- a/Icons/icons.pptx
+++ b/Icons/icons.pptx
@@ -598,7 +598,7 @@
   <pc:docChgLst>
     <pc:chgData name="Ludwig Sembach" userId="f8993c4f9875f6c3" providerId="LiveId" clId="{5EF81DD2-70D6-426C-B4A0-746E92C1E5B6}"/>
     <pc:docChg chg="custSel addSld modSld">
-      <pc:chgData name="Ludwig Sembach" userId="f8993c4f9875f6c3" providerId="LiveId" clId="{5EF81DD2-70D6-426C-B4A0-746E92C1E5B6}" dt="2022-03-12T19:19:24.923" v="19" actId="1076"/>
+      <pc:chgData name="Ludwig Sembach" userId="f8993c4f9875f6c3" providerId="LiveId" clId="{5EF81DD2-70D6-426C-B4A0-746E92C1E5B6}" dt="2022-03-15T23:15:11.825" v="29" actId="1076"/>
       <pc:docMkLst>
         <pc:docMk/>
       </pc:docMkLst>
@@ -634,7 +634,7 @@
         </pc:picChg>
       </pc:sldChg>
       <pc:sldChg chg="addSp delSp modSp new mod">
-        <pc:chgData name="Ludwig Sembach" userId="f8993c4f9875f6c3" providerId="LiveId" clId="{5EF81DD2-70D6-426C-B4A0-746E92C1E5B6}" dt="2022-03-07T22:00:27.576" v="7" actId="1076"/>
+        <pc:chgData name="Ludwig Sembach" userId="f8993c4f9875f6c3" providerId="LiveId" clId="{5EF81DD2-70D6-426C-B4A0-746E92C1E5B6}" dt="2022-03-15T23:15:11.825" v="29" actId="1076"/>
         <pc:sldMkLst>
           <pc:docMk/>
           <pc:sldMk cId="3167571959" sldId="259"/>
@@ -679,12 +679,36 @@
             <ac:picMk id="6" creationId="{DC2AC7FC-75A8-4F79-A0DB-F9B9E4C99C60}"/>
           </ac:picMkLst>
         </pc:picChg>
+        <pc:picChg chg="add del mod">
+          <ac:chgData name="Ludwig Sembach" userId="f8993c4f9875f6c3" providerId="LiveId" clId="{5EF81DD2-70D6-426C-B4A0-746E92C1E5B6}" dt="2022-03-15T23:14:55.474" v="24" actId="478"/>
+          <ac:picMkLst>
+            <pc:docMk/>
+            <pc:sldMk cId="3167571959" sldId="259"/>
+            <ac:picMk id="7" creationId="{C73EDD9F-7CAA-4D73-B081-1007707AE773}"/>
+          </ac:picMkLst>
+        </pc:picChg>
         <pc:picChg chg="add mod">
           <ac:chgData name="Ludwig Sembach" userId="f8993c4f9875f6c3" providerId="LiveId" clId="{5EF81DD2-70D6-426C-B4A0-746E92C1E5B6}" dt="2022-03-07T22:00:27.576" v="7" actId="1076"/>
           <ac:picMkLst>
             <pc:docMk/>
             <pc:sldMk cId="3167571959" sldId="259"/>
             <ac:picMk id="8" creationId="{7588231F-1691-4B56-B929-A46E15A3131D}"/>
+          </ac:picMkLst>
+        </pc:picChg>
+        <pc:picChg chg="add mod">
+          <ac:chgData name="Ludwig Sembach" userId="f8993c4f9875f6c3" providerId="LiveId" clId="{5EF81DD2-70D6-426C-B4A0-746E92C1E5B6}" dt="2022-03-15T23:14:48.709" v="21" actId="207"/>
+          <ac:picMkLst>
+            <pc:docMk/>
+            <pc:sldMk cId="3167571959" sldId="259"/>
+            <ac:picMk id="9" creationId="{9F6B6B7E-1C2D-45D8-BE3A-B00541E5AEEC}"/>
+          </ac:picMkLst>
+        </pc:picChg>
+        <pc:picChg chg="add mod">
+          <ac:chgData name="Ludwig Sembach" userId="f8993c4f9875f6c3" providerId="LiveId" clId="{5EF81DD2-70D6-426C-B4A0-746E92C1E5B6}" dt="2022-03-15T23:15:11.825" v="29" actId="1076"/>
+          <ac:picMkLst>
+            <pc:docMk/>
+            <pc:sldMk cId="3167571959" sldId="259"/>
+            <ac:picMk id="10" creationId="{CD636031-F8BE-41A2-91DA-342162EE1CDE}"/>
           </ac:picMkLst>
         </pc:picChg>
       </pc:sldChg>
@@ -842,7 +866,7 @@
           <a:p>
             <a:fld id="{491D2BDA-6D50-47D5-9A42-A5FDEEAC005E}" type="datetimeFigureOut">
               <a:rPr lang="en-DE" smtClean="0"/>
-              <a:t>12/03/2022</a:t>
+              <a:t>16/03/2022</a:t>
             </a:fld>
             <a:endParaRPr lang="en-DE"/>
           </a:p>
@@ -1042,7 +1066,7 @@
           <a:p>
             <a:fld id="{491D2BDA-6D50-47D5-9A42-A5FDEEAC005E}" type="datetimeFigureOut">
               <a:rPr lang="en-DE" smtClean="0"/>
-              <a:t>12/03/2022</a:t>
+              <a:t>16/03/2022</a:t>
             </a:fld>
             <a:endParaRPr lang="en-DE"/>
           </a:p>
@@ -1252,7 +1276,7 @@
           <a:p>
             <a:fld id="{491D2BDA-6D50-47D5-9A42-A5FDEEAC005E}" type="datetimeFigureOut">
               <a:rPr lang="en-DE" smtClean="0"/>
-              <a:t>12/03/2022</a:t>
+              <a:t>16/03/2022</a:t>
             </a:fld>
             <a:endParaRPr lang="en-DE"/>
           </a:p>
@@ -1452,7 +1476,7 @@
           <a:p>
             <a:fld id="{491D2BDA-6D50-47D5-9A42-A5FDEEAC005E}" type="datetimeFigureOut">
               <a:rPr lang="en-DE" smtClean="0"/>
-              <a:t>12/03/2022</a:t>
+              <a:t>16/03/2022</a:t>
             </a:fld>
             <a:endParaRPr lang="en-DE"/>
           </a:p>
@@ -1728,7 +1752,7 @@
           <a:p>
             <a:fld id="{491D2BDA-6D50-47D5-9A42-A5FDEEAC005E}" type="datetimeFigureOut">
               <a:rPr lang="en-DE" smtClean="0"/>
-              <a:t>12/03/2022</a:t>
+              <a:t>16/03/2022</a:t>
             </a:fld>
             <a:endParaRPr lang="en-DE"/>
           </a:p>
@@ -1996,7 +2020,7 @@
           <a:p>
             <a:fld id="{491D2BDA-6D50-47D5-9A42-A5FDEEAC005E}" type="datetimeFigureOut">
               <a:rPr lang="en-DE" smtClean="0"/>
-              <a:t>12/03/2022</a:t>
+              <a:t>16/03/2022</a:t>
             </a:fld>
             <a:endParaRPr lang="en-DE"/>
           </a:p>
@@ -2411,7 +2435,7 @@
           <a:p>
             <a:fld id="{491D2BDA-6D50-47D5-9A42-A5FDEEAC005E}" type="datetimeFigureOut">
               <a:rPr lang="en-DE" smtClean="0"/>
-              <a:t>12/03/2022</a:t>
+              <a:t>16/03/2022</a:t>
             </a:fld>
             <a:endParaRPr lang="en-DE"/>
           </a:p>
@@ -2553,7 +2577,7 @@
           <a:p>
             <a:fld id="{491D2BDA-6D50-47D5-9A42-A5FDEEAC005E}" type="datetimeFigureOut">
               <a:rPr lang="en-DE" smtClean="0"/>
-              <a:t>12/03/2022</a:t>
+              <a:t>16/03/2022</a:t>
             </a:fld>
             <a:endParaRPr lang="en-DE"/>
           </a:p>
@@ -2666,7 +2690,7 @@
           <a:p>
             <a:fld id="{491D2BDA-6D50-47D5-9A42-A5FDEEAC005E}" type="datetimeFigureOut">
               <a:rPr lang="en-DE" smtClean="0"/>
-              <a:t>12/03/2022</a:t>
+              <a:t>16/03/2022</a:t>
             </a:fld>
             <a:endParaRPr lang="en-DE"/>
           </a:p>
@@ -2979,7 +3003,7 @@
           <a:p>
             <a:fld id="{491D2BDA-6D50-47D5-9A42-A5FDEEAC005E}" type="datetimeFigureOut">
               <a:rPr lang="en-DE" smtClean="0"/>
-              <a:t>12/03/2022</a:t>
+              <a:t>16/03/2022</a:t>
             </a:fld>
             <a:endParaRPr lang="en-DE"/>
           </a:p>
@@ -3268,7 +3292,7 @@
           <a:p>
             <a:fld id="{491D2BDA-6D50-47D5-9A42-A5FDEEAC005E}" type="datetimeFigureOut">
               <a:rPr lang="en-DE" smtClean="0"/>
-              <a:t>12/03/2022</a:t>
+              <a:t>16/03/2022</a:t>
             </a:fld>
             <a:endParaRPr lang="en-DE"/>
           </a:p>
@@ -3511,7 +3535,7 @@
           <a:p>
             <a:fld id="{491D2BDA-6D50-47D5-9A42-A5FDEEAC005E}" type="datetimeFigureOut">
               <a:rPr lang="en-DE" smtClean="0"/>
-              <a:t>12/03/2022</a:t>
+              <a:t>16/03/2022</a:t>
             </a:fld>
             <a:endParaRPr lang="en-DE"/>
           </a:p>
@@ -6409,6 +6433,84 @@
           </a:prstGeom>
         </p:spPr>
       </p:pic>
+      <p:pic>
+        <p:nvPicPr>
+          <p:cNvPr id="9" name="Graphic 8" descr="Disconnected with solid fill">
+            <a:extLst>
+              <a:ext uri="{FF2B5EF4-FFF2-40B4-BE49-F238E27FC236}">
+                <a16:creationId xmlns:a16="http://schemas.microsoft.com/office/drawing/2014/main" id="{9F6B6B7E-1C2D-45D8-BE3A-B00541E5AEEC}"/>
+              </a:ext>
+            </a:extLst>
+          </p:cNvPr>
+          <p:cNvPicPr>
+            <a:picLocks noChangeAspect="1"/>
+          </p:cNvPicPr>
+          <p:nvPr/>
+        </p:nvPicPr>
+        <p:blipFill>
+          <a:blip r:embed="rId10">
+            <a:extLst>
+              <a:ext uri="{28A0092B-C50C-407E-A947-70E740481C1C}">
+                <a14:useLocalDpi xmlns:a14="http://schemas.microsoft.com/office/drawing/2010/main" val="0"/>
+              </a:ext>
+              <a:ext uri="{96DAC541-7B7A-43D3-8B79-37D633B846F1}">
+                <asvg:svgBlip xmlns:asvg="http://schemas.microsoft.com/office/drawing/2016/SVG/main" r:embed="rId11"/>
+              </a:ext>
+            </a:extLst>
+          </a:blip>
+          <a:stretch>
+            <a:fillRect/>
+          </a:stretch>
+        </p:blipFill>
+        <p:spPr>
+          <a:xfrm>
+            <a:off x="10462721" y="3856860"/>
+            <a:ext cx="914400" cy="914400"/>
+          </a:xfrm>
+          <a:prstGeom prst="rect">
+            <a:avLst/>
+          </a:prstGeom>
+        </p:spPr>
+      </p:pic>
+      <p:pic>
+        <p:nvPicPr>
+          <p:cNvPr id="10" name="Graphic 9" descr="Badge Follow outline">
+            <a:extLst>
+              <a:ext uri="{FF2B5EF4-FFF2-40B4-BE49-F238E27FC236}">
+                <a16:creationId xmlns:a16="http://schemas.microsoft.com/office/drawing/2014/main" id="{CD636031-F8BE-41A2-91DA-342162EE1CDE}"/>
+              </a:ext>
+            </a:extLst>
+          </p:cNvPr>
+          <p:cNvPicPr>
+            <a:picLocks noChangeAspect="1"/>
+          </p:cNvPicPr>
+          <p:nvPr/>
+        </p:nvPicPr>
+        <p:blipFill>
+          <a:blip r:embed="rId12">
+            <a:extLst>
+              <a:ext uri="{28A0092B-C50C-407E-A947-70E740481C1C}">
+                <a14:useLocalDpi xmlns:a14="http://schemas.microsoft.com/office/drawing/2010/main" val="0"/>
+              </a:ext>
+              <a:ext uri="{96DAC541-7B7A-43D3-8B79-37D633B846F1}">
+                <asvg:svgBlip xmlns:asvg="http://schemas.microsoft.com/office/drawing/2016/SVG/main" r:embed="rId13"/>
+              </a:ext>
+            </a:extLst>
+          </a:blip>
+          <a:stretch>
+            <a:fillRect/>
+          </a:stretch>
+        </p:blipFill>
+        <p:spPr>
+          <a:xfrm>
+            <a:off x="7782980" y="4789232"/>
+            <a:ext cx="914400" cy="914400"/>
+          </a:xfrm>
+          <a:prstGeom prst="rect">
+            <a:avLst/>
+          </a:prstGeom>
+        </p:spPr>
+      </p:pic>
     </p:spTree>
     <p:extLst>
       <p:ext uri="{BB962C8B-B14F-4D97-AF65-F5344CB8AC3E}">

</xml_diff>

<commit_message>
RawConverter section filled with functionality
</commit_message>
<xml_diff>
--- a/Icons/icons.pptx
+++ b/Icons/icons.pptx
@@ -598,7 +598,7 @@
   <pc:docChgLst>
     <pc:chgData name="Ludwig Sembach" userId="f8993c4f9875f6c3" providerId="LiveId" clId="{5EF81DD2-70D6-426C-B4A0-746E92C1E5B6}"/>
     <pc:docChg chg="custSel addSld modSld">
-      <pc:chgData name="Ludwig Sembach" userId="f8993c4f9875f6c3" providerId="LiveId" clId="{5EF81DD2-70D6-426C-B4A0-746E92C1E5B6}" dt="2022-03-21T23:24:11.265" v="33" actId="1076"/>
+      <pc:chgData name="Ludwig Sembach" userId="f8993c4f9875f6c3" providerId="LiveId" clId="{5EF81DD2-70D6-426C-B4A0-746E92C1E5B6}" dt="2022-03-22T23:12:31.028" v="35" actId="1076"/>
       <pc:docMkLst>
         <pc:docMk/>
       </pc:docMkLst>
@@ -642,7 +642,7 @@
         </pc:picChg>
       </pc:sldChg>
       <pc:sldChg chg="addSp delSp modSp new mod">
-        <pc:chgData name="Ludwig Sembach" userId="f8993c4f9875f6c3" providerId="LiveId" clId="{5EF81DD2-70D6-426C-B4A0-746E92C1E5B6}" dt="2022-03-15T23:15:11.825" v="29" actId="1076"/>
+        <pc:chgData name="Ludwig Sembach" userId="f8993c4f9875f6c3" providerId="LiveId" clId="{5EF81DD2-70D6-426C-B4A0-746E92C1E5B6}" dt="2022-03-22T23:12:31.028" v="35" actId="1076"/>
         <pc:sldMkLst>
           <pc:docMk/>
           <pc:sldMk cId="3167571959" sldId="259"/>
@@ -663,6 +663,14 @@
             <ac:spMk id="3" creationId="{97F58A4D-7C72-4A8C-BE92-20599345BFD4}"/>
           </ac:spMkLst>
         </pc:spChg>
+        <pc:picChg chg="add mod">
+          <ac:chgData name="Ludwig Sembach" userId="f8993c4f9875f6c3" providerId="LiveId" clId="{5EF81DD2-70D6-426C-B4A0-746E92C1E5B6}" dt="2022-03-22T23:12:31.028" v="35" actId="1076"/>
+          <ac:picMkLst>
+            <pc:docMk/>
+            <pc:sldMk cId="3167571959" sldId="259"/>
+            <ac:picMk id="3" creationId="{A1E4B237-E974-479B-8B3B-84015B1AB72E}"/>
+          </ac:picMkLst>
+        </pc:picChg>
         <pc:picChg chg="add mod">
           <ac:chgData name="Ludwig Sembach" userId="f8993c4f9875f6c3" providerId="LiveId" clId="{5EF81DD2-70D6-426C-B4A0-746E92C1E5B6}" dt="2022-03-07T21:53:55.869" v="3" actId="207"/>
           <ac:picMkLst>
@@ -874,7 +882,7 @@
           <a:p>
             <a:fld id="{491D2BDA-6D50-47D5-9A42-A5FDEEAC005E}" type="datetimeFigureOut">
               <a:rPr lang="en-DE" smtClean="0"/>
-              <a:t>22/03/2022</a:t>
+              <a:t>23/03/2022</a:t>
             </a:fld>
             <a:endParaRPr lang="en-DE"/>
           </a:p>
@@ -1074,7 +1082,7 @@
           <a:p>
             <a:fld id="{491D2BDA-6D50-47D5-9A42-A5FDEEAC005E}" type="datetimeFigureOut">
               <a:rPr lang="en-DE" smtClean="0"/>
-              <a:t>22/03/2022</a:t>
+              <a:t>23/03/2022</a:t>
             </a:fld>
             <a:endParaRPr lang="en-DE"/>
           </a:p>
@@ -1284,7 +1292,7 @@
           <a:p>
             <a:fld id="{491D2BDA-6D50-47D5-9A42-A5FDEEAC005E}" type="datetimeFigureOut">
               <a:rPr lang="en-DE" smtClean="0"/>
-              <a:t>22/03/2022</a:t>
+              <a:t>23/03/2022</a:t>
             </a:fld>
             <a:endParaRPr lang="en-DE"/>
           </a:p>
@@ -1484,7 +1492,7 @@
           <a:p>
             <a:fld id="{491D2BDA-6D50-47D5-9A42-A5FDEEAC005E}" type="datetimeFigureOut">
               <a:rPr lang="en-DE" smtClean="0"/>
-              <a:t>22/03/2022</a:t>
+              <a:t>23/03/2022</a:t>
             </a:fld>
             <a:endParaRPr lang="en-DE"/>
           </a:p>
@@ -1760,7 +1768,7 @@
           <a:p>
             <a:fld id="{491D2BDA-6D50-47D5-9A42-A5FDEEAC005E}" type="datetimeFigureOut">
               <a:rPr lang="en-DE" smtClean="0"/>
-              <a:t>22/03/2022</a:t>
+              <a:t>23/03/2022</a:t>
             </a:fld>
             <a:endParaRPr lang="en-DE"/>
           </a:p>
@@ -2028,7 +2036,7 @@
           <a:p>
             <a:fld id="{491D2BDA-6D50-47D5-9A42-A5FDEEAC005E}" type="datetimeFigureOut">
               <a:rPr lang="en-DE" smtClean="0"/>
-              <a:t>22/03/2022</a:t>
+              <a:t>23/03/2022</a:t>
             </a:fld>
             <a:endParaRPr lang="en-DE"/>
           </a:p>
@@ -2443,7 +2451,7 @@
           <a:p>
             <a:fld id="{491D2BDA-6D50-47D5-9A42-A5FDEEAC005E}" type="datetimeFigureOut">
               <a:rPr lang="en-DE" smtClean="0"/>
-              <a:t>22/03/2022</a:t>
+              <a:t>23/03/2022</a:t>
             </a:fld>
             <a:endParaRPr lang="en-DE"/>
           </a:p>
@@ -2585,7 +2593,7 @@
           <a:p>
             <a:fld id="{491D2BDA-6D50-47D5-9A42-A5FDEEAC005E}" type="datetimeFigureOut">
               <a:rPr lang="en-DE" smtClean="0"/>
-              <a:t>22/03/2022</a:t>
+              <a:t>23/03/2022</a:t>
             </a:fld>
             <a:endParaRPr lang="en-DE"/>
           </a:p>
@@ -2698,7 +2706,7 @@
           <a:p>
             <a:fld id="{491D2BDA-6D50-47D5-9A42-A5FDEEAC005E}" type="datetimeFigureOut">
               <a:rPr lang="en-DE" smtClean="0"/>
-              <a:t>22/03/2022</a:t>
+              <a:t>23/03/2022</a:t>
             </a:fld>
             <a:endParaRPr lang="en-DE"/>
           </a:p>
@@ -3011,7 +3019,7 @@
           <a:p>
             <a:fld id="{491D2BDA-6D50-47D5-9A42-A5FDEEAC005E}" type="datetimeFigureOut">
               <a:rPr lang="en-DE" smtClean="0"/>
-              <a:t>22/03/2022</a:t>
+              <a:t>23/03/2022</a:t>
             </a:fld>
             <a:endParaRPr lang="en-DE"/>
           </a:p>
@@ -3300,7 +3308,7 @@
           <a:p>
             <a:fld id="{491D2BDA-6D50-47D5-9A42-A5FDEEAC005E}" type="datetimeFigureOut">
               <a:rPr lang="en-DE" smtClean="0"/>
-              <a:t>22/03/2022</a:t>
+              <a:t>23/03/2022</a:t>
             </a:fld>
             <a:endParaRPr lang="en-DE"/>
           </a:p>
@@ -3543,7 +3551,7 @@
           <a:p>
             <a:fld id="{491D2BDA-6D50-47D5-9A42-A5FDEEAC005E}" type="datetimeFigureOut">
               <a:rPr lang="en-DE" smtClean="0"/>
-              <a:t>22/03/2022</a:t>
+              <a:t>23/03/2022</a:t>
             </a:fld>
             <a:endParaRPr lang="en-DE"/>
           </a:p>
@@ -6558,6 +6566,45 @@
           </a:prstGeom>
         </p:spPr>
       </p:pic>
+      <p:pic>
+        <p:nvPicPr>
+          <p:cNvPr id="3" name="Graphic 2" descr="Large paint brush with solid fill">
+            <a:extLst>
+              <a:ext uri="{FF2B5EF4-FFF2-40B4-BE49-F238E27FC236}">
+                <a16:creationId xmlns:a16="http://schemas.microsoft.com/office/drawing/2014/main" id="{A1E4B237-E974-479B-8B3B-84015B1AB72E}"/>
+              </a:ext>
+            </a:extLst>
+          </p:cNvPr>
+          <p:cNvPicPr>
+            <a:picLocks noChangeAspect="1"/>
+          </p:cNvPicPr>
+          <p:nvPr/>
+        </p:nvPicPr>
+        <p:blipFill>
+          <a:blip r:embed="rId14">
+            <a:extLst>
+              <a:ext uri="{28A0092B-C50C-407E-A947-70E740481C1C}">
+                <a14:useLocalDpi xmlns:a14="http://schemas.microsoft.com/office/drawing/2010/main" val="0"/>
+              </a:ext>
+              <a:ext uri="{96DAC541-7B7A-43D3-8B79-37D633B846F1}">
+                <asvg:svgBlip xmlns:asvg="http://schemas.microsoft.com/office/drawing/2016/SVG/main" r:embed="rId15"/>
+              </a:ext>
+            </a:extLst>
+          </a:blip>
+          <a:stretch>
+            <a:fillRect/>
+          </a:stretch>
+        </p:blipFill>
+        <p:spPr>
+          <a:xfrm>
+            <a:off x="5587954" y="4821889"/>
+            <a:ext cx="914400" cy="914400"/>
+          </a:xfrm>
+          <a:prstGeom prst="rect">
+            <a:avLst/>
+          </a:prstGeom>
+        </p:spPr>
+      </p:pic>
     </p:spTree>
     <p:extLst>
       <p:ext uri="{BB962C8B-B14F-4D97-AF65-F5344CB8AC3E}">

</xml_diff>

<commit_message>
cancellation of raw converter integrated
</commit_message>
<xml_diff>
--- a/Icons/icons.pptx
+++ b/Icons/icons.pptx
@@ -598,12 +598,12 @@
   <pc:docChgLst>
     <pc:chgData name="Ludwig Sembach" userId="f8993c4f9875f6c3" providerId="LiveId" clId="{5EF81DD2-70D6-426C-B4A0-746E92C1E5B6}"/>
     <pc:docChg chg="custSel addSld modSld">
-      <pc:chgData name="Ludwig Sembach" userId="f8993c4f9875f6c3" providerId="LiveId" clId="{5EF81DD2-70D6-426C-B4A0-746E92C1E5B6}" dt="2022-03-22T23:12:31.028" v="35" actId="1076"/>
+      <pc:chgData name="Ludwig Sembach" userId="f8993c4f9875f6c3" providerId="LiveId" clId="{5EF81DD2-70D6-426C-B4A0-746E92C1E5B6}" dt="2022-03-23T23:25:42.606" v="38" actId="1076"/>
       <pc:docMkLst>
         <pc:docMk/>
       </pc:docMkLst>
       <pc:sldChg chg="addSp modSp mod">
-        <pc:chgData name="Ludwig Sembach" userId="f8993c4f9875f6c3" providerId="LiveId" clId="{5EF81DD2-70D6-426C-B4A0-746E92C1E5B6}" dt="2022-03-21T23:24:11.265" v="33" actId="1076"/>
+        <pc:chgData name="Ludwig Sembach" userId="f8993c4f9875f6c3" providerId="LiveId" clId="{5EF81DD2-70D6-426C-B4A0-746E92C1E5B6}" dt="2022-03-23T23:25:42.606" v="38" actId="1076"/>
         <pc:sldMkLst>
           <pc:docMk/>
           <pc:sldMk cId="1423015805" sldId="256"/>
@@ -638,6 +638,14 @@
             <pc:docMk/>
             <pc:sldMk cId="1423015805" sldId="256"/>
             <ac:picMk id="25" creationId="{DEAE0658-1C05-4910-B289-B33A988A5FCF}"/>
+          </ac:picMkLst>
+        </pc:picChg>
+        <pc:picChg chg="add mod">
+          <ac:chgData name="Ludwig Sembach" userId="f8993c4f9875f6c3" providerId="LiveId" clId="{5EF81DD2-70D6-426C-B4A0-746E92C1E5B6}" dt="2022-03-23T23:25:42.606" v="38" actId="1076"/>
+          <ac:picMkLst>
+            <pc:docMk/>
+            <pc:sldMk cId="1423015805" sldId="256"/>
+            <ac:picMk id="26" creationId="{8C024233-DE2C-47A0-9085-32FBA56336D4}"/>
           </ac:picMkLst>
         </pc:picChg>
       </pc:sldChg>
@@ -882,7 +890,7 @@
           <a:p>
             <a:fld id="{491D2BDA-6D50-47D5-9A42-A5FDEEAC005E}" type="datetimeFigureOut">
               <a:rPr lang="en-DE" smtClean="0"/>
-              <a:t>23/03/2022</a:t>
+              <a:t>24/03/2022</a:t>
             </a:fld>
             <a:endParaRPr lang="en-DE"/>
           </a:p>
@@ -1082,7 +1090,7 @@
           <a:p>
             <a:fld id="{491D2BDA-6D50-47D5-9A42-A5FDEEAC005E}" type="datetimeFigureOut">
               <a:rPr lang="en-DE" smtClean="0"/>
-              <a:t>23/03/2022</a:t>
+              <a:t>24/03/2022</a:t>
             </a:fld>
             <a:endParaRPr lang="en-DE"/>
           </a:p>
@@ -1292,7 +1300,7 @@
           <a:p>
             <a:fld id="{491D2BDA-6D50-47D5-9A42-A5FDEEAC005E}" type="datetimeFigureOut">
               <a:rPr lang="en-DE" smtClean="0"/>
-              <a:t>23/03/2022</a:t>
+              <a:t>24/03/2022</a:t>
             </a:fld>
             <a:endParaRPr lang="en-DE"/>
           </a:p>
@@ -1492,7 +1500,7 @@
           <a:p>
             <a:fld id="{491D2BDA-6D50-47D5-9A42-A5FDEEAC005E}" type="datetimeFigureOut">
               <a:rPr lang="en-DE" smtClean="0"/>
-              <a:t>23/03/2022</a:t>
+              <a:t>24/03/2022</a:t>
             </a:fld>
             <a:endParaRPr lang="en-DE"/>
           </a:p>
@@ -1768,7 +1776,7 @@
           <a:p>
             <a:fld id="{491D2BDA-6D50-47D5-9A42-A5FDEEAC005E}" type="datetimeFigureOut">
               <a:rPr lang="en-DE" smtClean="0"/>
-              <a:t>23/03/2022</a:t>
+              <a:t>24/03/2022</a:t>
             </a:fld>
             <a:endParaRPr lang="en-DE"/>
           </a:p>
@@ -2036,7 +2044,7 @@
           <a:p>
             <a:fld id="{491D2BDA-6D50-47D5-9A42-A5FDEEAC005E}" type="datetimeFigureOut">
               <a:rPr lang="en-DE" smtClean="0"/>
-              <a:t>23/03/2022</a:t>
+              <a:t>24/03/2022</a:t>
             </a:fld>
             <a:endParaRPr lang="en-DE"/>
           </a:p>
@@ -2451,7 +2459,7 @@
           <a:p>
             <a:fld id="{491D2BDA-6D50-47D5-9A42-A5FDEEAC005E}" type="datetimeFigureOut">
               <a:rPr lang="en-DE" smtClean="0"/>
-              <a:t>23/03/2022</a:t>
+              <a:t>24/03/2022</a:t>
             </a:fld>
             <a:endParaRPr lang="en-DE"/>
           </a:p>
@@ -2593,7 +2601,7 @@
           <a:p>
             <a:fld id="{491D2BDA-6D50-47D5-9A42-A5FDEEAC005E}" type="datetimeFigureOut">
               <a:rPr lang="en-DE" smtClean="0"/>
-              <a:t>23/03/2022</a:t>
+              <a:t>24/03/2022</a:t>
             </a:fld>
             <a:endParaRPr lang="en-DE"/>
           </a:p>
@@ -2706,7 +2714,7 @@
           <a:p>
             <a:fld id="{491D2BDA-6D50-47D5-9A42-A5FDEEAC005E}" type="datetimeFigureOut">
               <a:rPr lang="en-DE" smtClean="0"/>
-              <a:t>23/03/2022</a:t>
+              <a:t>24/03/2022</a:t>
             </a:fld>
             <a:endParaRPr lang="en-DE"/>
           </a:p>
@@ -3019,7 +3027,7 @@
           <a:p>
             <a:fld id="{491D2BDA-6D50-47D5-9A42-A5FDEEAC005E}" type="datetimeFigureOut">
               <a:rPr lang="en-DE" smtClean="0"/>
-              <a:t>23/03/2022</a:t>
+              <a:t>24/03/2022</a:t>
             </a:fld>
             <a:endParaRPr lang="en-DE"/>
           </a:p>
@@ -3308,7 +3316,7 @@
           <a:p>
             <a:fld id="{491D2BDA-6D50-47D5-9A42-A5FDEEAC005E}" type="datetimeFigureOut">
               <a:rPr lang="en-DE" smtClean="0"/>
-              <a:t>23/03/2022</a:t>
+              <a:t>24/03/2022</a:t>
             </a:fld>
             <a:endParaRPr lang="en-DE"/>
           </a:p>
@@ -3551,7 +3559,7 @@
           <a:p>
             <a:fld id="{491D2BDA-6D50-47D5-9A42-A5FDEEAC005E}" type="datetimeFigureOut">
               <a:rPr lang="en-DE" smtClean="0"/>
-              <a:t>23/03/2022</a:t>
+              <a:t>24/03/2022</a:t>
             </a:fld>
             <a:endParaRPr lang="en-DE"/>
           </a:p>
@@ -6302,6 +6310,45 @@
           </a:prstGeom>
         </p:spPr>
       </p:pic>
+      <p:pic>
+        <p:nvPicPr>
+          <p:cNvPr id="26" name="Graphic 25" descr="Stop with solid fill">
+            <a:extLst>
+              <a:ext uri="{FF2B5EF4-FFF2-40B4-BE49-F238E27FC236}">
+                <a16:creationId xmlns:a16="http://schemas.microsoft.com/office/drawing/2014/main" id="{8C024233-DE2C-47A0-9085-32FBA56336D4}"/>
+              </a:ext>
+            </a:extLst>
+          </p:cNvPr>
+          <p:cNvPicPr>
+            <a:picLocks noChangeAspect="1"/>
+          </p:cNvPicPr>
+          <p:nvPr/>
+        </p:nvPicPr>
+        <p:blipFill>
+          <a:blip r:embed="rId42">
+            <a:extLst>
+              <a:ext uri="{28A0092B-C50C-407E-A947-70E740481C1C}">
+                <a14:useLocalDpi xmlns:a14="http://schemas.microsoft.com/office/drawing/2010/main" val="0"/>
+              </a:ext>
+              <a:ext uri="{96DAC541-7B7A-43D3-8B79-37D633B846F1}">
+                <asvg:svgBlip xmlns:asvg="http://schemas.microsoft.com/office/drawing/2016/SVG/main" r:embed="rId43"/>
+              </a:ext>
+            </a:extLst>
+          </a:blip>
+          <a:stretch>
+            <a:fillRect/>
+          </a:stretch>
+        </p:blipFill>
+        <p:spPr>
+          <a:xfrm>
+            <a:off x="4523870" y="3187257"/>
+            <a:ext cx="914400" cy="914400"/>
+          </a:xfrm>
+          <a:prstGeom prst="rect">
+            <a:avLst/>
+          </a:prstGeom>
+        </p:spPr>
+      </p:pic>
     </p:spTree>
     <p:extLst>
       <p:ext uri="{BB962C8B-B14F-4D97-AF65-F5344CB8AC3E}">

</xml_diff>